<commit_message>
changes to the ppt
</commit_message>
<xml_diff>
--- a/Boston_Housing_Case_Study.pptx
+++ b/Boston_Housing_Case_Study.pptx
@@ -2741,7 +2741,7 @@
           <a:p>
             <a:fld id="{29BDD8CD-BBD6-44C8-8D68-FD523970EB29}" type="datetimeFigureOut">
               <a:rPr lang="en-US" smtClean="0"/>
-              <a:t>4/23/2023</a:t>
+              <a:t>4/27/2024</a:t>
             </a:fld>
             <a:endParaRPr lang="en-US"/>
           </a:p>
@@ -2949,7 +2949,7 @@
           <a:p>
             <a:fld id="{29BDD8CD-BBD6-44C8-8D68-FD523970EB29}" type="datetimeFigureOut">
               <a:rPr lang="en-US" smtClean="0"/>
-              <a:t>4/23/2023</a:t>
+              <a:t>4/27/2024</a:t>
             </a:fld>
             <a:endParaRPr lang="en-US"/>
           </a:p>
@@ -3205,7 +3205,7 @@
           <a:p>
             <a:fld id="{29BDD8CD-BBD6-44C8-8D68-FD523970EB29}" type="datetimeFigureOut">
               <a:rPr lang="en-US" smtClean="0"/>
-              <a:t>4/23/2023</a:t>
+              <a:t>4/27/2024</a:t>
             </a:fld>
             <a:endParaRPr lang="en-US"/>
           </a:p>
@@ -3379,7 +3379,7 @@
           <a:p>
             <a:fld id="{29BDD8CD-BBD6-44C8-8D68-FD523970EB29}" type="datetimeFigureOut">
               <a:rPr lang="en-US" smtClean="0"/>
-              <a:t>4/23/2023</a:t>
+              <a:t>4/27/2024</a:t>
             </a:fld>
             <a:endParaRPr lang="en-US"/>
           </a:p>
@@ -3722,7 +3722,7 @@
           <a:p>
             <a:fld id="{29BDD8CD-BBD6-44C8-8D68-FD523970EB29}" type="datetimeFigureOut">
               <a:rPr lang="en-US" smtClean="0"/>
-              <a:t>4/23/2023</a:t>
+              <a:t>4/27/2024</a:t>
             </a:fld>
             <a:endParaRPr lang="en-US"/>
           </a:p>
@@ -3997,7 +3997,7 @@
           <a:p>
             <a:fld id="{29BDD8CD-BBD6-44C8-8D68-FD523970EB29}" type="datetimeFigureOut">
               <a:rPr lang="en-US" smtClean="0"/>
-              <a:t>4/23/2023</a:t>
+              <a:t>4/27/2024</a:t>
             </a:fld>
             <a:endParaRPr lang="en-US"/>
           </a:p>
@@ -4376,7 +4376,7 @@
           <a:p>
             <a:fld id="{29BDD8CD-BBD6-44C8-8D68-FD523970EB29}" type="datetimeFigureOut">
               <a:rPr lang="en-US" smtClean="0"/>
-              <a:t>4/23/2023</a:t>
+              <a:t>4/27/2024</a:t>
             </a:fld>
             <a:endParaRPr lang="en-US"/>
           </a:p>
@@ -4494,7 +4494,7 @@
           <a:p>
             <a:fld id="{29BDD8CD-BBD6-44C8-8D68-FD523970EB29}" type="datetimeFigureOut">
               <a:rPr lang="en-US" smtClean="0"/>
-              <a:t>4/23/2023</a:t>
+              <a:t>4/27/2024</a:t>
             </a:fld>
             <a:endParaRPr lang="en-US"/>
           </a:p>
@@ -4665,7 +4665,7 @@
           <a:p>
             <a:fld id="{29BDD8CD-BBD6-44C8-8D68-FD523970EB29}" type="datetimeFigureOut">
               <a:rPr lang="en-US" smtClean="0"/>
-              <a:t>4/23/2023</a:t>
+              <a:t>4/27/2024</a:t>
             </a:fld>
             <a:endParaRPr lang="en-US"/>
           </a:p>
@@ -5019,7 +5019,7 @@
           <a:p>
             <a:fld id="{29BDD8CD-BBD6-44C8-8D68-FD523970EB29}" type="datetimeFigureOut">
               <a:rPr lang="en-US" smtClean="0"/>
-              <a:t>4/23/2023</a:t>
+              <a:t>4/27/2024</a:t>
             </a:fld>
             <a:endParaRPr lang="en-US"/>
           </a:p>
@@ -5401,7 +5401,7 @@
           <a:p>
             <a:fld id="{29BDD8CD-BBD6-44C8-8D68-FD523970EB29}" type="datetimeFigureOut">
               <a:rPr lang="en-US" smtClean="0"/>
-              <a:t>4/23/2023</a:t>
+              <a:t>4/27/2024</a:t>
             </a:fld>
             <a:endParaRPr lang="en-US"/>
           </a:p>
@@ -5688,7 +5688,7 @@
           <a:p>
             <a:fld id="{29BDD8CD-BBD6-44C8-8D68-FD523970EB29}" type="datetimeFigureOut">
               <a:rPr lang="en-US" smtClean="0"/>
-              <a:t>4/23/2023</a:t>
+              <a:t>4/27/2024</a:t>
             </a:fld>
             <a:endParaRPr lang="en-US"/>
           </a:p>
@@ -6279,7 +6279,7 @@
         </p:spPr>
         <p:txBody>
           <a:bodyPr>
-            <a:normAutofit lnSpcReduction="10000"/>
+            <a:normAutofit/>
           </a:bodyPr>
           <a:lstStyle/>
           <a:p>
@@ -6291,30 +6291,6 @@
               </a:rPr>
               <a:t>SUREDDI AKHILESH</a:t>
             </a:r>
-          </a:p>
-          <a:p>
-            <a:pPr algn="ctr"/>
-            <a:r>
-              <a:rPr lang="en-US" sz="1200" dirty="0">
-                <a:latin typeface="Lato Extended"/>
-              </a:rPr>
-              <a:t>M14828693</a:t>
-            </a:r>
-            <a:endParaRPr lang="en-US" sz="1200" b="0" i="0" dirty="0">
-              <a:effectLst/>
-              <a:latin typeface="Lato Extended"/>
-            </a:endParaRPr>
-          </a:p>
-          <a:p>
-            <a:pPr algn="ctr"/>
-            <a:r>
-              <a:rPr lang="en-US" sz="1200" b="0" i="0" dirty="0">
-                <a:effectLst/>
-                <a:latin typeface="Lato Extended"/>
-              </a:rPr>
-              <a:t>7047-002</a:t>
-            </a:r>
-            <a:endParaRPr lang="en-US" sz="1200" dirty="0"/>
           </a:p>
         </p:txBody>
       </p:sp>

</xml_diff>